<commit_message>
Added Source Control slides and scripts
</commit_message>
<xml_diff>
--- a/Introduction to SQL Pt2/Introduction to SQL pt2.pptx
+++ b/Introduction to SQL Pt2/Introduction to SQL pt2.pptx
@@ -353,7 +353,7 @@
           <a:p>
             <a:fld id="{E1CF454A-F24C-49B6-B135-BDED86FD6AF4}" type="datetimeFigureOut">
               <a:rPr lang="en-GB" smtClean="0"/>
-              <a:t>28/01/2019</a:t>
+              <a:t>14/02/2019</a:t>
             </a:fld>
             <a:endParaRPr lang="en-GB"/>
           </a:p>
@@ -561,7 +561,7 @@
           <a:p>
             <a:fld id="{E1CF454A-F24C-49B6-B135-BDED86FD6AF4}" type="datetimeFigureOut">
               <a:rPr lang="en-GB" smtClean="0"/>
-              <a:t>28/01/2019</a:t>
+              <a:t>14/02/2019</a:t>
             </a:fld>
             <a:endParaRPr lang="en-GB"/>
           </a:p>
@@ -817,7 +817,7 @@
           <a:p>
             <a:fld id="{E1CF454A-F24C-49B6-B135-BDED86FD6AF4}" type="datetimeFigureOut">
               <a:rPr lang="en-GB" smtClean="0"/>
-              <a:t>28/01/2019</a:t>
+              <a:t>14/02/2019</a:t>
             </a:fld>
             <a:endParaRPr lang="en-GB"/>
           </a:p>
@@ -987,7 +987,7 @@
           <a:p>
             <a:fld id="{E1CF454A-F24C-49B6-B135-BDED86FD6AF4}" type="datetimeFigureOut">
               <a:rPr lang="en-GB" smtClean="0"/>
-              <a:t>28/01/2019</a:t>
+              <a:t>14/02/2019</a:t>
             </a:fld>
             <a:endParaRPr lang="en-GB"/>
           </a:p>
@@ -1330,7 +1330,7 @@
           <a:p>
             <a:fld id="{E1CF454A-F24C-49B6-B135-BDED86FD6AF4}" type="datetimeFigureOut">
               <a:rPr lang="en-GB" smtClean="0"/>
-              <a:t>28/01/2019</a:t>
+              <a:t>14/02/2019</a:t>
             </a:fld>
             <a:endParaRPr lang="en-GB"/>
           </a:p>
@@ -1605,7 +1605,7 @@
           <a:p>
             <a:fld id="{E1CF454A-F24C-49B6-B135-BDED86FD6AF4}" type="datetimeFigureOut">
               <a:rPr lang="en-GB" smtClean="0"/>
-              <a:t>28/01/2019</a:t>
+              <a:t>14/02/2019</a:t>
             </a:fld>
             <a:endParaRPr lang="en-GB"/>
           </a:p>
@@ -1984,7 +1984,7 @@
           <a:p>
             <a:fld id="{E1CF454A-F24C-49B6-B135-BDED86FD6AF4}" type="datetimeFigureOut">
               <a:rPr lang="en-GB" smtClean="0"/>
-              <a:t>28/01/2019</a:t>
+              <a:t>14/02/2019</a:t>
             </a:fld>
             <a:endParaRPr lang="en-GB"/>
           </a:p>
@@ -2102,7 +2102,7 @@
           <a:p>
             <a:fld id="{E1CF454A-F24C-49B6-B135-BDED86FD6AF4}" type="datetimeFigureOut">
               <a:rPr lang="en-GB" smtClean="0"/>
-              <a:t>28/01/2019</a:t>
+              <a:t>14/02/2019</a:t>
             </a:fld>
             <a:endParaRPr lang="en-GB"/>
           </a:p>
@@ -2273,7 +2273,7 @@
           <a:p>
             <a:fld id="{E1CF454A-F24C-49B6-B135-BDED86FD6AF4}" type="datetimeFigureOut">
               <a:rPr lang="en-GB" smtClean="0"/>
-              <a:t>28/01/2019</a:t>
+              <a:t>14/02/2019</a:t>
             </a:fld>
             <a:endParaRPr lang="en-GB"/>
           </a:p>
@@ -2627,7 +2627,7 @@
           <a:p>
             <a:fld id="{E1CF454A-F24C-49B6-B135-BDED86FD6AF4}" type="datetimeFigureOut">
               <a:rPr lang="en-GB" smtClean="0"/>
-              <a:t>28/01/2019</a:t>
+              <a:t>14/02/2019</a:t>
             </a:fld>
             <a:endParaRPr lang="en-GB"/>
           </a:p>
@@ -3004,7 +3004,7 @@
           <a:p>
             <a:fld id="{E1CF454A-F24C-49B6-B135-BDED86FD6AF4}" type="datetimeFigureOut">
               <a:rPr lang="en-GB" smtClean="0"/>
-              <a:t>28/01/2019</a:t>
+              <a:t>14/02/2019</a:t>
             </a:fld>
             <a:endParaRPr lang="en-GB"/>
           </a:p>
@@ -3291,7 +3291,7 @@
           <a:p>
             <a:fld id="{E1CF454A-F24C-49B6-B135-BDED86FD6AF4}" type="datetimeFigureOut">
               <a:rPr lang="en-GB" smtClean="0"/>
-              <a:t>28/01/2019</a:t>
+              <a:t>14/02/2019</a:t>
             </a:fld>
             <a:endParaRPr lang="en-GB"/>
           </a:p>
@@ -4855,7 +4855,7 @@
           <a:p>
             <a:r>
               <a:rPr lang="en-GB" dirty="0"/>
-              <a:t>Window functions</a:t>
+              <a:t>Subquery</a:t>
             </a:r>
           </a:p>
         </p:txBody>

</xml_diff>